<commit_message>
add the rest of it
</commit_message>
<xml_diff>
--- a/04_presentation/HABs with Sentinel-2.pptx
+++ b/04_presentation/HABs with Sentinel-2.pptx
@@ -8,7 +8,19 @@
     <p:sldId id="256" r:id="rId2"/>
     <p:sldId id="257" r:id="rId3"/>
     <p:sldId id="258" r:id="rId4"/>
-    <p:sldId id="259" r:id="rId5"/>
+    <p:sldId id="264" r:id="rId5"/>
+    <p:sldId id="271" r:id="rId6"/>
+    <p:sldId id="259" r:id="rId7"/>
+    <p:sldId id="260" r:id="rId8"/>
+    <p:sldId id="261" r:id="rId9"/>
+    <p:sldId id="262" r:id="rId10"/>
+    <p:sldId id="268" r:id="rId11"/>
+    <p:sldId id="263" r:id="rId12"/>
+    <p:sldId id="265" r:id="rId13"/>
+    <p:sldId id="266" r:id="rId14"/>
+    <p:sldId id="270" r:id="rId15"/>
+    <p:sldId id="267" r:id="rId16"/>
+    <p:sldId id="269" r:id="rId17"/>
   </p:sldIdLst>
   <p:sldSz cx="12192000" cy="6858000"/>
   <p:notesSz cx="6858000" cy="9144000"/>
@@ -341,7 +353,7 @@
           <a:p>
             <a:fld id="{9AB3A824-1A51-4B26-AD58-A6D8E14F6C04}" type="datetimeFigureOut">
               <a:rPr lang="en-US" smtClean="0"/>
-              <a:t>9/27/2020</a:t>
+              <a:t>12/3/2020</a:t>
             </a:fld>
             <a:endParaRPr lang="en-US" dirty="0"/>
           </a:p>
@@ -474,87 +486,93 @@
         </p:nvSpPr>
         <p:spPr/>
         <p:txBody>
+          <a:bodyPr>
+            <a:normAutofit/>
+          </a:bodyPr>
+          <a:lstStyle>
+            <a:lvl1pPr>
+              <a:defRPr sz="3600"/>
+            </a:lvl1pPr>
+          </a:lstStyle>
+          <a:p>
+            <a:r>
+              <a:rPr lang="en-US" smtClean="0"/>
+              <a:t>Click to edit Master title style</a:t>
+            </a:r>
+            <a:endParaRPr lang="en-US" dirty="0"/>
+          </a:p>
+        </p:txBody>
+      </p:sp>
+      <p:sp>
+        <p:nvSpPr>
+          <p:cNvPr id="3" name="Vertical Text Placeholder 2"/>
+          <p:cNvSpPr>
+            <a:spLocks noGrp="1"/>
+          </p:cNvSpPr>
+          <p:nvPr>
+            <p:ph type="body" orient="vert" idx="1"/>
+          </p:nvPr>
+        </p:nvSpPr>
+        <p:spPr/>
+        <p:txBody>
+          <a:bodyPr vert="eaVert" lIns="45720" tIns="0" rIns="45720" bIns="0"/>
+          <a:lstStyle/>
+          <a:p>
+            <a:pPr lvl="0"/>
+            <a:r>
+              <a:rPr lang="en-US" smtClean="0"/>
+              <a:t>Edit Master text styles</a:t>
+            </a:r>
+          </a:p>
+          <a:p>
+            <a:pPr lvl="1"/>
+            <a:r>
+              <a:rPr lang="en-US" smtClean="0"/>
+              <a:t>Second level</a:t>
+            </a:r>
+          </a:p>
+          <a:p>
+            <a:pPr lvl="2"/>
+            <a:r>
+              <a:rPr lang="en-US" smtClean="0"/>
+              <a:t>Third level</a:t>
+            </a:r>
+          </a:p>
+          <a:p>
+            <a:pPr lvl="3"/>
+            <a:r>
+              <a:rPr lang="en-US" smtClean="0"/>
+              <a:t>Fourth level</a:t>
+            </a:r>
+          </a:p>
+          <a:p>
+            <a:pPr lvl="4"/>
+            <a:r>
+              <a:rPr lang="en-US" smtClean="0"/>
+              <a:t>Fifth level</a:t>
+            </a:r>
+            <a:endParaRPr lang="en-US" dirty="0"/>
+          </a:p>
+        </p:txBody>
+      </p:sp>
+      <p:sp>
+        <p:nvSpPr>
+          <p:cNvPr id="4" name="Date Placeholder 3"/>
+          <p:cNvSpPr>
+            <a:spLocks noGrp="1"/>
+          </p:cNvSpPr>
+          <p:nvPr>
+            <p:ph type="dt" sz="half" idx="10"/>
+          </p:nvPr>
+        </p:nvSpPr>
+        <p:spPr/>
+        <p:txBody>
           <a:bodyPr/>
           <a:lstStyle/>
           <a:p>
-            <a:r>
-              <a:rPr lang="en-US" smtClean="0"/>
-              <a:t>Click to edit Master title style</a:t>
-            </a:r>
-            <a:endParaRPr lang="en-US" dirty="0"/>
-          </a:p>
-        </p:txBody>
-      </p:sp>
-      <p:sp>
-        <p:nvSpPr>
-          <p:cNvPr id="3" name="Vertical Text Placeholder 2"/>
-          <p:cNvSpPr>
-            <a:spLocks noGrp="1"/>
-          </p:cNvSpPr>
-          <p:nvPr>
-            <p:ph type="body" orient="vert" idx="1"/>
-          </p:nvPr>
-        </p:nvSpPr>
-        <p:spPr/>
-        <p:txBody>
-          <a:bodyPr vert="eaVert" lIns="45720" tIns="0" rIns="45720" bIns="0"/>
-          <a:lstStyle/>
-          <a:p>
-            <a:pPr lvl="0"/>
-            <a:r>
-              <a:rPr lang="en-US" smtClean="0"/>
-              <a:t>Edit Master text styles</a:t>
-            </a:r>
-          </a:p>
-          <a:p>
-            <a:pPr lvl="1"/>
-            <a:r>
-              <a:rPr lang="en-US" smtClean="0"/>
-              <a:t>Second level</a:t>
-            </a:r>
-          </a:p>
-          <a:p>
-            <a:pPr lvl="2"/>
-            <a:r>
-              <a:rPr lang="en-US" smtClean="0"/>
-              <a:t>Third level</a:t>
-            </a:r>
-          </a:p>
-          <a:p>
-            <a:pPr lvl="3"/>
-            <a:r>
-              <a:rPr lang="en-US" smtClean="0"/>
-              <a:t>Fourth level</a:t>
-            </a:r>
-          </a:p>
-          <a:p>
-            <a:pPr lvl="4"/>
-            <a:r>
-              <a:rPr lang="en-US" smtClean="0"/>
-              <a:t>Fifth level</a:t>
-            </a:r>
-            <a:endParaRPr lang="en-US" dirty="0"/>
-          </a:p>
-        </p:txBody>
-      </p:sp>
-      <p:sp>
-        <p:nvSpPr>
-          <p:cNvPr id="4" name="Date Placeholder 3"/>
-          <p:cNvSpPr>
-            <a:spLocks noGrp="1"/>
-          </p:cNvSpPr>
-          <p:nvPr>
-            <p:ph type="dt" sz="half" idx="10"/>
-          </p:nvPr>
-        </p:nvSpPr>
-        <p:spPr/>
-        <p:txBody>
-          <a:bodyPr/>
-          <a:lstStyle/>
-          <a:p>
             <a:fld id="{D857E33E-8B18-4087-B112-809917729534}" type="datetimeFigureOut">
               <a:rPr lang="en-US" smtClean="0"/>
-              <a:t>9/27/2020</a:t>
+              <a:t>12/3/2020</a:t>
             </a:fld>
             <a:endParaRPr lang="en-US" dirty="0"/>
           </a:p>
@@ -617,6 +635,13 @@
   <p:clrMapOvr>
     <a:masterClrMapping/>
   </p:clrMapOvr>
+  <p:timing>
+    <p:tnLst>
+      <p:par>
+        <p:cTn id="1" dur="indefinite" restart="never" nodeType="tmRoot"/>
+      </p:par>
+    </p:tnLst>
+  </p:timing>
 </p:sldLayout>
 </file>
 
@@ -730,8 +755,14 @@
           </a:xfrm>
         </p:spPr>
         <p:txBody>
-          <a:bodyPr vert="eaVert"/>
-          <a:lstStyle/>
+          <a:bodyPr vert="eaVert">
+            <a:normAutofit/>
+          </a:bodyPr>
+          <a:lstStyle>
+            <a:lvl1pPr>
+              <a:defRPr sz="3600"/>
+            </a:lvl1pPr>
+          </a:lstStyle>
           <a:p>
             <a:r>
               <a:rPr lang="en-US" smtClean="0"/>
@@ -815,7 +846,7 @@
           <a:p>
             <a:fld id="{D3FFE419-2371-464F-8239-3959401C3561}" type="datetimeFigureOut">
               <a:rPr lang="en-US" smtClean="0"/>
-              <a:t>9/27/2020</a:t>
+              <a:t>12/3/2020</a:t>
             </a:fld>
             <a:endParaRPr lang="en-US" dirty="0"/>
           </a:p>
@@ -878,6 +909,13 @@
   <p:clrMapOvr>
     <a:masterClrMapping/>
   </p:clrMapOvr>
+  <p:timing>
+    <p:tnLst>
+      <p:par>
+        <p:cTn id="1" dur="indefinite" restart="never" nodeType="tmRoot"/>
+      </p:par>
+    </p:tnLst>
+  </p:timing>
 </p:sldLayout>
 </file>
 
@@ -910,25 +948,83 @@
         </p:nvSpPr>
         <p:spPr/>
         <p:txBody>
+          <a:bodyPr>
+            <a:normAutofit/>
+          </a:bodyPr>
+          <a:lstStyle>
+            <a:lvl1pPr>
+              <a:defRPr sz="3600"/>
+            </a:lvl1pPr>
+          </a:lstStyle>
+          <a:p>
+            <a:r>
+              <a:rPr lang="en-US" smtClean="0"/>
+              <a:t>Click to edit Master title style</a:t>
+            </a:r>
+            <a:endParaRPr lang="en-US" dirty="0"/>
+          </a:p>
+        </p:txBody>
+      </p:sp>
+      <p:sp>
+        <p:nvSpPr>
+          <p:cNvPr id="3" name="Content Placeholder 2"/>
+          <p:cNvSpPr>
+            <a:spLocks noGrp="1"/>
+          </p:cNvSpPr>
+          <p:nvPr>
+            <p:ph idx="1"/>
+          </p:nvPr>
+        </p:nvSpPr>
+        <p:spPr/>
+        <p:txBody>
           <a:bodyPr/>
           <a:lstStyle/>
           <a:p>
-            <a:r>
-              <a:rPr lang="en-US" smtClean="0"/>
-              <a:t>Click to edit Master title style</a:t>
-            </a:r>
-            <a:endParaRPr lang="en-US" dirty="0"/>
-          </a:p>
-        </p:txBody>
-      </p:sp>
-      <p:sp>
-        <p:nvSpPr>
-          <p:cNvPr id="3" name="Content Placeholder 2"/>
-          <p:cNvSpPr>
-            <a:spLocks noGrp="1"/>
-          </p:cNvSpPr>
-          <p:nvPr>
-            <p:ph idx="1"/>
+            <a:pPr lvl="0"/>
+            <a:r>
+              <a:rPr lang="en-US" smtClean="0"/>
+              <a:t>Edit Master text styles</a:t>
+            </a:r>
+          </a:p>
+          <a:p>
+            <a:pPr lvl="1"/>
+            <a:r>
+              <a:rPr lang="en-US" smtClean="0"/>
+              <a:t>Second level</a:t>
+            </a:r>
+          </a:p>
+          <a:p>
+            <a:pPr lvl="2"/>
+            <a:r>
+              <a:rPr lang="en-US" smtClean="0"/>
+              <a:t>Third level</a:t>
+            </a:r>
+          </a:p>
+          <a:p>
+            <a:pPr lvl="3"/>
+            <a:r>
+              <a:rPr lang="en-US" smtClean="0"/>
+              <a:t>Fourth level</a:t>
+            </a:r>
+          </a:p>
+          <a:p>
+            <a:pPr lvl="4"/>
+            <a:r>
+              <a:rPr lang="en-US" smtClean="0"/>
+              <a:t>Fifth level</a:t>
+            </a:r>
+            <a:endParaRPr lang="en-US" dirty="0"/>
+          </a:p>
+        </p:txBody>
+      </p:sp>
+      <p:sp>
+        <p:nvSpPr>
+          <p:cNvPr id="4" name="Date Placeholder 3"/>
+          <p:cNvSpPr>
+            <a:spLocks noGrp="1"/>
+          </p:cNvSpPr>
+          <p:nvPr>
+            <p:ph type="dt" sz="half" idx="10"/>
           </p:nvPr>
         </p:nvSpPr>
         <p:spPr/>
@@ -936,61 +1032,9 @@
           <a:bodyPr/>
           <a:lstStyle/>
           <a:p>
-            <a:pPr lvl="0"/>
-            <a:r>
-              <a:rPr lang="en-US" smtClean="0"/>
-              <a:t>Edit Master text styles</a:t>
-            </a:r>
-          </a:p>
-          <a:p>
-            <a:pPr lvl="1"/>
-            <a:r>
-              <a:rPr lang="en-US" smtClean="0"/>
-              <a:t>Second level</a:t>
-            </a:r>
-          </a:p>
-          <a:p>
-            <a:pPr lvl="2"/>
-            <a:r>
-              <a:rPr lang="en-US" smtClean="0"/>
-              <a:t>Third level</a:t>
-            </a:r>
-          </a:p>
-          <a:p>
-            <a:pPr lvl="3"/>
-            <a:r>
-              <a:rPr lang="en-US" smtClean="0"/>
-              <a:t>Fourth level</a:t>
-            </a:r>
-          </a:p>
-          <a:p>
-            <a:pPr lvl="4"/>
-            <a:r>
-              <a:rPr lang="en-US" smtClean="0"/>
-              <a:t>Fifth level</a:t>
-            </a:r>
-            <a:endParaRPr lang="en-US" dirty="0"/>
-          </a:p>
-        </p:txBody>
-      </p:sp>
-      <p:sp>
-        <p:nvSpPr>
-          <p:cNvPr id="4" name="Date Placeholder 3"/>
-          <p:cNvSpPr>
-            <a:spLocks noGrp="1"/>
-          </p:cNvSpPr>
-          <p:nvPr>
-            <p:ph type="dt" sz="half" idx="10"/>
-          </p:nvPr>
-        </p:nvSpPr>
-        <p:spPr/>
-        <p:txBody>
-          <a:bodyPr/>
-          <a:lstStyle/>
-          <a:p>
             <a:fld id="{97D162C4-EDD9-4389-A98B-B87ECEA2A816}" type="datetimeFigureOut">
               <a:rPr lang="en-US" smtClean="0"/>
-              <a:t>9/27/2020</a:t>
+              <a:t>12/3/2020</a:t>
             </a:fld>
             <a:endParaRPr lang="en-US" dirty="0"/>
           </a:p>
@@ -1053,6 +1097,13 @@
   <p:clrMapOvr>
     <a:masterClrMapping/>
   </p:clrMapOvr>
+  <p:timing>
+    <p:tnLst>
+      <p:par>
+        <p:cTn id="1" dur="indefinite" restart="never" nodeType="tmRoot"/>
+      </p:par>
+    </p:tnLst>
+  </p:timing>
 </p:sldLayout>
 </file>
 
@@ -1338,7 +1389,7 @@
           <a:p>
             <a:fld id="{3E5059C3-6A89-4494-99FF-5A4D6FFD50EB}" type="datetimeFigureOut">
               <a:rPr lang="en-US" smtClean="0"/>
-              <a:t>9/27/2020</a:t>
+              <a:t>12/3/2020</a:t>
             </a:fld>
             <a:endParaRPr lang="en-US" dirty="0"/>
           </a:p>
@@ -1476,8 +1527,14 @@
           </a:xfrm>
         </p:spPr>
         <p:txBody>
-          <a:bodyPr/>
-          <a:lstStyle/>
+          <a:bodyPr>
+            <a:normAutofit/>
+          </a:bodyPr>
+          <a:lstStyle>
+            <a:lvl1pPr>
+              <a:defRPr sz="3600"/>
+            </a:lvl1pPr>
+          </a:lstStyle>
           <a:p>
             <a:r>
               <a:rPr lang="en-US" smtClean="0"/>
@@ -1618,7 +1675,7 @@
           <a:p>
             <a:fld id="{CA954B2F-12DE-47F5-8894-472B206D2E1E}" type="datetimeFigureOut">
               <a:rPr lang="en-US" smtClean="0"/>
-              <a:t>9/27/2020</a:t>
+              <a:t>12/3/2020</a:t>
             </a:fld>
             <a:endParaRPr lang="en-US" dirty="0"/>
           </a:p>
@@ -1681,6 +1738,13 @@
   <p:clrMapOvr>
     <a:masterClrMapping/>
   </p:clrMapOvr>
+  <p:timing>
+    <p:tnLst>
+      <p:par>
+        <p:cTn id="1" dur="indefinite" restart="never" nodeType="tmRoot"/>
+      </p:par>
+    </p:tnLst>
+  </p:timing>
 </p:sldLayout>
 </file>
 
@@ -1718,8 +1782,14 @@
           </a:xfrm>
         </p:spPr>
         <p:txBody>
-          <a:bodyPr/>
-          <a:lstStyle/>
+          <a:bodyPr>
+            <a:normAutofit/>
+          </a:bodyPr>
+          <a:lstStyle>
+            <a:lvl1pPr>
+              <a:defRPr sz="3600"/>
+            </a:lvl1pPr>
+          </a:lstStyle>
           <a:p>
             <a:r>
               <a:rPr lang="en-US" smtClean="0"/>
@@ -2002,7 +2072,7 @@
           <a:p>
             <a:fld id="{3F30E46F-7819-4ACF-B48B-48222C2ACC88}" type="datetimeFigureOut">
               <a:rPr lang="en-US" smtClean="0"/>
-              <a:t>9/27/2020</a:t>
+              <a:t>12/3/2020</a:t>
             </a:fld>
             <a:endParaRPr lang="en-US" dirty="0"/>
           </a:p>
@@ -2065,6 +2135,13 @@
   <p:clrMapOvr>
     <a:masterClrMapping/>
   </p:clrMapOvr>
+  <p:timing>
+    <p:tnLst>
+      <p:par>
+        <p:cTn id="1" dur="indefinite" restart="never" nodeType="tmRoot"/>
+      </p:par>
+    </p:tnLst>
+  </p:timing>
 </p:sldLayout>
 </file>
 
@@ -2097,35 +2174,41 @@
         </p:nvSpPr>
         <p:spPr/>
         <p:txBody>
+          <a:bodyPr>
+            <a:normAutofit/>
+          </a:bodyPr>
+          <a:lstStyle>
+            <a:lvl1pPr>
+              <a:defRPr sz="3600"/>
+            </a:lvl1pPr>
+          </a:lstStyle>
+          <a:p>
+            <a:r>
+              <a:rPr lang="en-US" smtClean="0"/>
+              <a:t>Click to edit Master title style</a:t>
+            </a:r>
+            <a:endParaRPr lang="en-US" dirty="0"/>
+          </a:p>
+        </p:txBody>
+      </p:sp>
+      <p:sp>
+        <p:nvSpPr>
+          <p:cNvPr id="3" name="Date Placeholder 2"/>
+          <p:cNvSpPr>
+            <a:spLocks noGrp="1"/>
+          </p:cNvSpPr>
+          <p:nvPr>
+            <p:ph type="dt" sz="half" idx="10"/>
+          </p:nvPr>
+        </p:nvSpPr>
+        <p:spPr/>
+        <p:txBody>
           <a:bodyPr/>
           <a:lstStyle/>
           <a:p>
-            <a:r>
-              <a:rPr lang="en-US" smtClean="0"/>
-              <a:t>Click to edit Master title style</a:t>
-            </a:r>
-            <a:endParaRPr lang="en-US" dirty="0"/>
-          </a:p>
-        </p:txBody>
-      </p:sp>
-      <p:sp>
-        <p:nvSpPr>
-          <p:cNvPr id="3" name="Date Placeholder 2"/>
-          <p:cNvSpPr>
-            <a:spLocks noGrp="1"/>
-          </p:cNvSpPr>
-          <p:nvPr>
-            <p:ph type="dt" sz="half" idx="10"/>
-          </p:nvPr>
-        </p:nvSpPr>
-        <p:spPr/>
-        <p:txBody>
-          <a:bodyPr/>
-          <a:lstStyle/>
-          <a:p>
             <a:fld id="{1FAF3416-4057-4DAA-829D-4CA07428D088}" type="datetimeFigureOut">
               <a:rPr lang="en-US" smtClean="0"/>
-              <a:t>9/27/2020</a:t>
+              <a:t>12/3/2020</a:t>
             </a:fld>
             <a:endParaRPr lang="en-US" dirty="0"/>
           </a:p>
@@ -2188,6 +2271,13 @@
   <p:clrMapOvr>
     <a:masterClrMapping/>
   </p:clrMapOvr>
+  <p:timing>
+    <p:tnLst>
+      <p:par>
+        <p:cTn id="1" dur="indefinite" restart="never" nodeType="tmRoot"/>
+      </p:par>
+    </p:tnLst>
+  </p:timing>
 </p:sldLayout>
 </file>
 
@@ -2301,7 +2391,7 @@
           <a:p>
             <a:fld id="{921D9284-D300-4297-87F7-E791DCC15DB1}" type="datetimeFigureOut">
               <a:rPr lang="en-US" smtClean="0"/>
-              <a:t>9/27/2020</a:t>
+              <a:t>12/3/2020</a:t>
             </a:fld>
             <a:endParaRPr lang="en-US" dirty="0"/>
           </a:p>
@@ -2660,7 +2750,7 @@
           <a:p>
             <a:fld id="{37D525BB-DA17-4BA0-B3C8-3AC3ABC827E6}" type="datetimeFigureOut">
               <a:rPr lang="en-US" smtClean="0"/>
-              <a:t>9/27/2020</a:t>
+              <a:t>12/3/2020</a:t>
             </a:fld>
             <a:endParaRPr lang="en-US" dirty="0"/>
           </a:p>
@@ -2744,6 +2834,13 @@
   <p:clrMapOvr>
     <a:masterClrMapping/>
   </p:clrMapOvr>
+  <p:timing>
+    <p:tnLst>
+      <p:par>
+        <p:cTn id="1" dur="indefinite" restart="never" nodeType="tmRoot"/>
+      </p:par>
+    </p:tnLst>
+  </p:timing>
 </p:sldLayout>
 </file>
 
@@ -3042,7 +3139,7 @@
           <a:p>
             <a:fld id="{B16C4C9A-3960-41CF-A4E9-2A8FB932454B}" type="datetimeFigureOut">
               <a:rPr lang="en-US" smtClean="0"/>
-              <a:t>9/27/2020</a:t>
+              <a:t>12/3/2020</a:t>
             </a:fld>
             <a:endParaRPr lang="en-US" dirty="0"/>
           </a:p>
@@ -3105,6 +3202,13 @@
   <p:clrMapOvr>
     <a:masterClrMapping/>
   </p:clrMapOvr>
+  <p:timing>
+    <p:tnLst>
+      <p:par>
+        <p:cTn id="1" dur="indefinite" restart="never" nodeType="tmRoot"/>
+      </p:par>
+    </p:tnLst>
+  </p:timing>
 </p:sldLayout>
 </file>
 
@@ -3334,7 +3438,7 @@
           <a:p>
             <a:fld id="{3CBC1C18-307B-4F68-A007-B5B542270E8D}" type="datetimeFigureOut">
               <a:rPr lang="en-US" smtClean="0"/>
-              <a:t>9/27/2020</a:t>
+              <a:t>12/3/2020</a:t>
             </a:fld>
             <a:endParaRPr lang="en-US" dirty="0"/>
           </a:p>
@@ -3479,6 +3583,13 @@
     <p:sldLayoutId id="2147483682" r:id="rId10"/>
     <p:sldLayoutId id="2147483683" r:id="rId11"/>
   </p:sldLayoutIdLst>
+  <p:timing>
+    <p:tnLst>
+      <p:par>
+        <p:cTn id="1" dur="indefinite" restart="never" nodeType="tmRoot"/>
+      </p:par>
+    </p:tnLst>
+  </p:timing>
   <p:hf sldNum="0" hdr="0" ftr="0" dt="0"/>
   <p:txStyles>
     <p:titleStyle>
@@ -3903,7 +4014,11 @@
           <a:bodyPr/>
           <a:lstStyle/>
           <a:p>
-            <a:endParaRPr lang="en-US"/>
+            <a:r>
+              <a:rPr lang="en-US" cap="none" dirty="0" smtClean="0"/>
+              <a:t>Keenan Ganz</a:t>
+            </a:r>
+            <a:endParaRPr lang="en-US" cap="none" dirty="0"/>
           </a:p>
         </p:txBody>
       </p:sp>
@@ -3917,6 +4032,912 @@
   <p:clrMapOvr>
     <a:masterClrMapping/>
   </p:clrMapOvr>
+  <p:timing>
+    <p:tnLst>
+      <p:par>
+        <p:cTn id="1" dur="indefinite" restart="never" nodeType="tmRoot"/>
+      </p:par>
+    </p:tnLst>
+  </p:timing>
+</p:sld>
+</file>
+
+<file path=ppt/slides/slide10.xml><?xml version="1.0" encoding="utf-8"?>
+<p:sld xmlns:a="http://schemas.openxmlformats.org/drawingml/2006/main" xmlns:r="http://schemas.openxmlformats.org/officeDocument/2006/relationships" xmlns:p="http://schemas.openxmlformats.org/presentationml/2006/main">
+  <p:cSld>
+    <p:spTree>
+      <p:nvGrpSpPr>
+        <p:cNvPr id="1" name=""/>
+        <p:cNvGrpSpPr/>
+        <p:nvPr/>
+      </p:nvGrpSpPr>
+      <p:grpSpPr>
+        <a:xfrm>
+          <a:off x="0" y="0"/>
+          <a:ext cx="0" cy="0"/>
+          <a:chOff x="0" y="0"/>
+          <a:chExt cx="0" cy="0"/>
+        </a:xfrm>
+      </p:grpSpPr>
+      <p:sp>
+        <p:nvSpPr>
+          <p:cNvPr id="3" name="Content Placeholder 2"/>
+          <p:cNvSpPr>
+            <a:spLocks noGrp="1"/>
+          </p:cNvSpPr>
+          <p:nvPr>
+            <p:ph idx="1"/>
+          </p:nvPr>
+        </p:nvSpPr>
+        <p:spPr/>
+        <p:txBody>
+          <a:bodyPr/>
+          <a:lstStyle/>
+          <a:p>
+            <a:endParaRPr lang="en-US"/>
+          </a:p>
+        </p:txBody>
+      </p:sp>
+      <p:sp>
+        <p:nvSpPr>
+          <p:cNvPr id="4" name="Title 3"/>
+          <p:cNvSpPr>
+            <a:spLocks noGrp="1"/>
+          </p:cNvSpPr>
+          <p:nvPr>
+            <p:ph type="title"/>
+          </p:nvPr>
+        </p:nvSpPr>
+        <p:spPr/>
+        <p:txBody>
+          <a:bodyPr/>
+          <a:lstStyle/>
+          <a:p>
+            <a:endParaRPr lang="en-US"/>
+          </a:p>
+        </p:txBody>
+      </p:sp>
+      <p:pic>
+        <p:nvPicPr>
+          <p:cNvPr id="5" name="Picture 4"/>
+          <p:cNvPicPr>
+            <a:picLocks noChangeAspect="1"/>
+          </p:cNvPicPr>
+          <p:nvPr/>
+        </p:nvPicPr>
+        <p:blipFill rotWithShape="1">
+          <a:blip r:embed="rId2"/>
+          <a:srcRect b="54618"/>
+          <a:stretch/>
+        </p:blipFill>
+        <p:spPr>
+          <a:xfrm>
+            <a:off x="0" y="1"/>
+            <a:ext cx="12192000" cy="3566160"/>
+          </a:xfrm>
+          <a:prstGeom prst="rect">
+            <a:avLst/>
+          </a:prstGeom>
+        </p:spPr>
+      </p:pic>
+      <p:pic>
+        <p:nvPicPr>
+          <p:cNvPr id="6" name="Picture 5"/>
+          <p:cNvPicPr>
+            <a:picLocks noChangeAspect="1"/>
+          </p:cNvPicPr>
+          <p:nvPr/>
+        </p:nvPicPr>
+        <p:blipFill rotWithShape="1">
+          <a:blip r:embed="rId3"/>
+          <a:srcRect t="2669" r="2904"/>
+          <a:stretch/>
+        </p:blipFill>
+        <p:spPr>
+          <a:xfrm>
+            <a:off x="18288" y="4050792"/>
+            <a:ext cx="13459968" cy="7045792"/>
+          </a:xfrm>
+          <a:prstGeom prst="rect">
+            <a:avLst/>
+          </a:prstGeom>
+        </p:spPr>
+      </p:pic>
+      <p:sp>
+        <p:nvSpPr>
+          <p:cNvPr id="7" name="TextBox 6"/>
+          <p:cNvSpPr txBox="1"/>
+          <p:nvPr/>
+        </p:nvSpPr>
+        <p:spPr>
+          <a:xfrm>
+            <a:off x="5917105" y="3623810"/>
+            <a:ext cx="357790" cy="369332"/>
+          </a:xfrm>
+          <a:prstGeom prst="rect">
+            <a:avLst/>
+          </a:prstGeom>
+          <a:noFill/>
+        </p:spPr>
+        <p:txBody>
+          <a:bodyPr wrap="none" rtlCol="0">
+            <a:spAutoFit/>
+          </a:bodyPr>
+          <a:lstStyle/>
+          <a:p>
+            <a:r>
+              <a:rPr lang="en-US" dirty="0" smtClean="0"/>
+              <a:t>...</a:t>
+            </a:r>
+            <a:endParaRPr lang="en-US" dirty="0"/>
+          </a:p>
+        </p:txBody>
+      </p:sp>
+    </p:spTree>
+    <p:extLst>
+      <p:ext uri="{BB962C8B-B14F-4D97-AF65-F5344CB8AC3E}">
+        <p14:creationId xmlns:p14="http://schemas.microsoft.com/office/powerpoint/2010/main" val="3056408761"/>
+      </p:ext>
+    </p:extLst>
+  </p:cSld>
+  <p:clrMapOvr>
+    <a:masterClrMapping/>
+  </p:clrMapOvr>
+  <p:timing>
+    <p:tnLst>
+      <p:par>
+        <p:cTn id="1" dur="indefinite" restart="never" nodeType="tmRoot"/>
+      </p:par>
+    </p:tnLst>
+  </p:timing>
+</p:sld>
+</file>
+
+<file path=ppt/slides/slide11.xml><?xml version="1.0" encoding="utf-8"?>
+<p:sld xmlns:a="http://schemas.openxmlformats.org/drawingml/2006/main" xmlns:r="http://schemas.openxmlformats.org/officeDocument/2006/relationships" xmlns:p="http://schemas.openxmlformats.org/presentationml/2006/main">
+  <p:cSld>
+    <p:spTree>
+      <p:nvGrpSpPr>
+        <p:cNvPr id="1" name=""/>
+        <p:cNvGrpSpPr/>
+        <p:nvPr/>
+      </p:nvGrpSpPr>
+      <p:grpSpPr>
+        <a:xfrm>
+          <a:off x="0" y="0"/>
+          <a:ext cx="0" cy="0"/>
+          <a:chOff x="0" y="0"/>
+          <a:chExt cx="0" cy="0"/>
+        </a:xfrm>
+      </p:grpSpPr>
+      <p:sp>
+        <p:nvSpPr>
+          <p:cNvPr id="2" name="Title 1"/>
+          <p:cNvSpPr>
+            <a:spLocks noGrp="1"/>
+          </p:cNvSpPr>
+          <p:nvPr>
+            <p:ph type="title"/>
+          </p:nvPr>
+        </p:nvSpPr>
+        <p:spPr/>
+        <p:txBody>
+          <a:bodyPr/>
+          <a:lstStyle/>
+          <a:p>
+            <a:r>
+              <a:rPr lang="en-US" dirty="0" smtClean="0"/>
+              <a:t>NDVI + 22 other indices, do any of them correlate well with chlorophyll or </a:t>
+            </a:r>
+            <a:r>
+              <a:rPr lang="en-US" dirty="0" err="1" smtClean="0"/>
+              <a:t>phycocyanin</a:t>
+            </a:r>
+            <a:r>
+              <a:rPr lang="en-US" dirty="0" smtClean="0"/>
+              <a:t> RFU?</a:t>
+            </a:r>
+            <a:endParaRPr lang="en-US" dirty="0"/>
+          </a:p>
+        </p:txBody>
+      </p:sp>
+      <p:sp>
+        <p:nvSpPr>
+          <p:cNvPr id="3" name="Content Placeholder 2"/>
+          <p:cNvSpPr>
+            <a:spLocks noGrp="1"/>
+          </p:cNvSpPr>
+          <p:nvPr>
+            <p:ph idx="1"/>
+          </p:nvPr>
+        </p:nvSpPr>
+        <p:spPr/>
+        <p:txBody>
+          <a:bodyPr/>
+          <a:lstStyle/>
+          <a:p>
+            <a:endParaRPr lang="en-US" dirty="0"/>
+          </a:p>
+        </p:txBody>
+      </p:sp>
+      <p:pic>
+        <p:nvPicPr>
+          <p:cNvPr id="5" name="Picture 4"/>
+          <p:cNvPicPr>
+            <a:picLocks noChangeAspect="1"/>
+          </p:cNvPicPr>
+          <p:nvPr/>
+        </p:nvPicPr>
+        <p:blipFill>
+          <a:blip r:embed="rId2"/>
+          <a:stretch>
+            <a:fillRect/>
+          </a:stretch>
+        </p:blipFill>
+        <p:spPr>
+          <a:xfrm>
+            <a:off x="1097280" y="1845733"/>
+            <a:ext cx="4096512" cy="4283043"/>
+          </a:xfrm>
+          <a:prstGeom prst="rect">
+            <a:avLst/>
+          </a:prstGeom>
+        </p:spPr>
+      </p:pic>
+      <p:pic>
+        <p:nvPicPr>
+          <p:cNvPr id="6" name="Picture 5"/>
+          <p:cNvPicPr>
+            <a:picLocks noChangeAspect="1"/>
+          </p:cNvPicPr>
+          <p:nvPr/>
+        </p:nvPicPr>
+        <p:blipFill>
+          <a:blip r:embed="rId3"/>
+          <a:stretch>
+            <a:fillRect/>
+          </a:stretch>
+        </p:blipFill>
+        <p:spPr>
+          <a:xfrm>
+            <a:off x="6957711" y="1737360"/>
+            <a:ext cx="4197969" cy="4389120"/>
+          </a:xfrm>
+          <a:prstGeom prst="rect">
+            <a:avLst/>
+          </a:prstGeom>
+        </p:spPr>
+      </p:pic>
+    </p:spTree>
+    <p:extLst>
+      <p:ext uri="{BB962C8B-B14F-4D97-AF65-F5344CB8AC3E}">
+        <p14:creationId xmlns:p14="http://schemas.microsoft.com/office/powerpoint/2010/main" val="4203005978"/>
+      </p:ext>
+    </p:extLst>
+  </p:cSld>
+  <p:clrMapOvr>
+    <a:masterClrMapping/>
+  </p:clrMapOvr>
+  <p:timing>
+    <p:tnLst>
+      <p:par>
+        <p:cTn id="1" dur="indefinite" restart="never" nodeType="tmRoot"/>
+      </p:par>
+    </p:tnLst>
+  </p:timing>
+</p:sld>
+</file>
+
+<file path=ppt/slides/slide12.xml><?xml version="1.0" encoding="utf-8"?>
+<p:sld xmlns:a="http://schemas.openxmlformats.org/drawingml/2006/main" xmlns:r="http://schemas.openxmlformats.org/officeDocument/2006/relationships" xmlns:p="http://schemas.openxmlformats.org/presentationml/2006/main">
+  <p:cSld>
+    <p:spTree>
+      <p:nvGrpSpPr>
+        <p:cNvPr id="1" name=""/>
+        <p:cNvGrpSpPr/>
+        <p:nvPr/>
+      </p:nvGrpSpPr>
+      <p:grpSpPr>
+        <a:xfrm>
+          <a:off x="0" y="0"/>
+          <a:ext cx="0" cy="0"/>
+          <a:chOff x="0" y="0"/>
+          <a:chExt cx="0" cy="0"/>
+        </a:xfrm>
+      </p:grpSpPr>
+      <p:sp>
+        <p:nvSpPr>
+          <p:cNvPr id="2" name="Title 1"/>
+          <p:cNvSpPr>
+            <a:spLocks noGrp="1"/>
+          </p:cNvSpPr>
+          <p:nvPr>
+            <p:ph type="title"/>
+          </p:nvPr>
+        </p:nvSpPr>
+        <p:spPr/>
+        <p:txBody>
+          <a:bodyPr/>
+          <a:lstStyle/>
+          <a:p>
+            <a:r>
+              <a:rPr lang="en-US" dirty="0" smtClean="0"/>
+              <a:t>Highly correlated data calls for neural network or random forest, do they work?</a:t>
+            </a:r>
+            <a:endParaRPr lang="en-US" dirty="0"/>
+          </a:p>
+        </p:txBody>
+      </p:sp>
+      <p:sp>
+        <p:nvSpPr>
+          <p:cNvPr id="3" name="Content Placeholder 2"/>
+          <p:cNvSpPr>
+            <a:spLocks noGrp="1"/>
+          </p:cNvSpPr>
+          <p:nvPr>
+            <p:ph idx="1"/>
+          </p:nvPr>
+        </p:nvSpPr>
+        <p:spPr/>
+        <p:txBody>
+          <a:bodyPr/>
+          <a:lstStyle/>
+          <a:p>
+            <a:endParaRPr lang="en-US" dirty="0"/>
+          </a:p>
+        </p:txBody>
+      </p:sp>
+    </p:spTree>
+    <p:extLst>
+      <p:ext uri="{BB962C8B-B14F-4D97-AF65-F5344CB8AC3E}">
+        <p14:creationId xmlns:p14="http://schemas.microsoft.com/office/powerpoint/2010/main" val="322562585"/>
+      </p:ext>
+    </p:extLst>
+  </p:cSld>
+  <p:clrMapOvr>
+    <a:masterClrMapping/>
+  </p:clrMapOvr>
+  <p:timing>
+    <p:tnLst>
+      <p:par>
+        <p:cTn id="1" dur="indefinite" restart="never" nodeType="tmRoot"/>
+      </p:par>
+    </p:tnLst>
+  </p:timing>
+</p:sld>
+</file>
+
+<file path=ppt/slides/slide13.xml><?xml version="1.0" encoding="utf-8"?>
+<p:sld xmlns:a="http://schemas.openxmlformats.org/drawingml/2006/main" xmlns:r="http://schemas.openxmlformats.org/officeDocument/2006/relationships" xmlns:p="http://schemas.openxmlformats.org/presentationml/2006/main">
+  <p:cSld>
+    <p:spTree>
+      <p:nvGrpSpPr>
+        <p:cNvPr id="1" name=""/>
+        <p:cNvGrpSpPr/>
+        <p:nvPr/>
+      </p:nvGrpSpPr>
+      <p:grpSpPr>
+        <a:xfrm>
+          <a:off x="0" y="0"/>
+          <a:ext cx="0" cy="0"/>
+          <a:chOff x="0" y="0"/>
+          <a:chExt cx="0" cy="0"/>
+        </a:xfrm>
+      </p:grpSpPr>
+      <p:sp>
+        <p:nvSpPr>
+          <p:cNvPr id="2" name="Title 1"/>
+          <p:cNvSpPr>
+            <a:spLocks noGrp="1"/>
+          </p:cNvSpPr>
+          <p:nvPr>
+            <p:ph type="title"/>
+          </p:nvPr>
+        </p:nvSpPr>
+        <p:spPr/>
+        <p:txBody>
+          <a:bodyPr/>
+          <a:lstStyle/>
+          <a:p>
+            <a:endParaRPr lang="en-US"/>
+          </a:p>
+        </p:txBody>
+      </p:sp>
+      <p:sp>
+        <p:nvSpPr>
+          <p:cNvPr id="3" name="Content Placeholder 2"/>
+          <p:cNvSpPr>
+            <a:spLocks noGrp="1"/>
+          </p:cNvSpPr>
+          <p:nvPr>
+            <p:ph idx="1"/>
+          </p:nvPr>
+        </p:nvSpPr>
+        <p:spPr/>
+        <p:txBody>
+          <a:bodyPr/>
+          <a:lstStyle/>
+          <a:p>
+            <a:endParaRPr lang="en-US"/>
+          </a:p>
+        </p:txBody>
+      </p:sp>
+      <p:pic>
+        <p:nvPicPr>
+          <p:cNvPr id="5" name="Picture 4"/>
+          <p:cNvPicPr>
+            <a:picLocks noChangeAspect="1"/>
+          </p:cNvPicPr>
+          <p:nvPr/>
+        </p:nvPicPr>
+        <p:blipFill>
+          <a:blip r:embed="rId2"/>
+          <a:stretch>
+            <a:fillRect/>
+          </a:stretch>
+        </p:blipFill>
+        <p:spPr>
+          <a:xfrm>
+            <a:off x="0" y="-1"/>
+            <a:ext cx="5567058" cy="6318505"/>
+          </a:xfrm>
+          <a:prstGeom prst="rect">
+            <a:avLst/>
+          </a:prstGeom>
+        </p:spPr>
+      </p:pic>
+      <p:pic>
+        <p:nvPicPr>
+          <p:cNvPr id="6" name="Picture 5"/>
+          <p:cNvPicPr>
+            <a:picLocks noChangeAspect="1"/>
+          </p:cNvPicPr>
+          <p:nvPr/>
+        </p:nvPicPr>
+        <p:blipFill>
+          <a:blip r:embed="rId3"/>
+          <a:stretch>
+            <a:fillRect/>
+          </a:stretch>
+        </p:blipFill>
+        <p:spPr>
+          <a:xfrm>
+            <a:off x="5567058" y="0"/>
+            <a:ext cx="6561930" cy="6318504"/>
+          </a:xfrm>
+          <a:prstGeom prst="rect">
+            <a:avLst/>
+          </a:prstGeom>
+        </p:spPr>
+      </p:pic>
+      <p:sp>
+        <p:nvSpPr>
+          <p:cNvPr id="4" name="TextBox 3"/>
+          <p:cNvSpPr txBox="1"/>
+          <p:nvPr/>
+        </p:nvSpPr>
+        <p:spPr>
+          <a:xfrm>
+            <a:off x="2258568" y="530352"/>
+            <a:ext cx="1773936" cy="369332"/>
+          </a:xfrm>
+          <a:prstGeom prst="rect">
+            <a:avLst/>
+          </a:prstGeom>
+          <a:noFill/>
+        </p:spPr>
+        <p:txBody>
+          <a:bodyPr wrap="square" rtlCol="0">
+            <a:spAutoFit/>
+          </a:bodyPr>
+          <a:lstStyle/>
+          <a:p>
+            <a:r>
+              <a:rPr lang="en-US" dirty="0" smtClean="0"/>
+              <a:t>MSE 0.138 RFU</a:t>
+            </a:r>
+            <a:endParaRPr lang="en-US" dirty="0"/>
+          </a:p>
+        </p:txBody>
+      </p:sp>
+      <p:sp>
+        <p:nvSpPr>
+          <p:cNvPr id="7" name="TextBox 6"/>
+          <p:cNvSpPr txBox="1"/>
+          <p:nvPr/>
+        </p:nvSpPr>
+        <p:spPr>
+          <a:xfrm>
+            <a:off x="9908001" y="530352"/>
+            <a:ext cx="1773936" cy="369332"/>
+          </a:xfrm>
+          <a:prstGeom prst="rect">
+            <a:avLst/>
+          </a:prstGeom>
+          <a:noFill/>
+        </p:spPr>
+        <p:txBody>
+          <a:bodyPr wrap="square" rtlCol="0">
+            <a:spAutoFit/>
+          </a:bodyPr>
+          <a:lstStyle/>
+          <a:p>
+            <a:r>
+              <a:rPr lang="en-US" dirty="0" smtClean="0"/>
+              <a:t>MSE 0.0978 RFU</a:t>
+            </a:r>
+            <a:endParaRPr lang="en-US" dirty="0"/>
+          </a:p>
+        </p:txBody>
+      </p:sp>
+    </p:spTree>
+    <p:extLst>
+      <p:ext uri="{BB962C8B-B14F-4D97-AF65-F5344CB8AC3E}">
+        <p14:creationId xmlns:p14="http://schemas.microsoft.com/office/powerpoint/2010/main" val="1757915290"/>
+      </p:ext>
+    </p:extLst>
+  </p:cSld>
+  <p:clrMapOvr>
+    <a:masterClrMapping/>
+  </p:clrMapOvr>
+  <p:timing>
+    <p:tnLst>
+      <p:par>
+        <p:cTn id="1" dur="indefinite" restart="never" nodeType="tmRoot"/>
+      </p:par>
+    </p:tnLst>
+  </p:timing>
+</p:sld>
+</file>
+
+<file path=ppt/slides/slide14.xml><?xml version="1.0" encoding="utf-8"?>
+<p:sld xmlns:a="http://schemas.openxmlformats.org/drawingml/2006/main" xmlns:r="http://schemas.openxmlformats.org/officeDocument/2006/relationships" xmlns:p="http://schemas.openxmlformats.org/presentationml/2006/main">
+  <p:cSld>
+    <p:spTree>
+      <p:nvGrpSpPr>
+        <p:cNvPr id="1" name=""/>
+        <p:cNvGrpSpPr/>
+        <p:nvPr/>
+      </p:nvGrpSpPr>
+      <p:grpSpPr>
+        <a:xfrm>
+          <a:off x="0" y="0"/>
+          <a:ext cx="0" cy="0"/>
+          <a:chOff x="0" y="0"/>
+          <a:chExt cx="0" cy="0"/>
+        </a:xfrm>
+      </p:grpSpPr>
+      <p:pic>
+        <p:nvPicPr>
+          <p:cNvPr id="4" name="Picture 3"/>
+          <p:cNvPicPr>
+            <a:picLocks noChangeAspect="1"/>
+          </p:cNvPicPr>
+          <p:nvPr/>
+        </p:nvPicPr>
+        <p:blipFill>
+          <a:blip r:embed="rId2"/>
+          <a:stretch>
+            <a:fillRect/>
+          </a:stretch>
+        </p:blipFill>
+        <p:spPr>
+          <a:xfrm>
+            <a:off x="2348630" y="0"/>
+            <a:ext cx="7553194" cy="6334937"/>
+          </a:xfrm>
+          <a:prstGeom prst="rect">
+            <a:avLst/>
+          </a:prstGeom>
+        </p:spPr>
+      </p:pic>
+      <p:sp>
+        <p:nvSpPr>
+          <p:cNvPr id="5" name="TextBox 4"/>
+          <p:cNvSpPr txBox="1"/>
+          <p:nvPr/>
+        </p:nvSpPr>
+        <p:spPr>
+          <a:xfrm>
+            <a:off x="8329808" y="5160723"/>
+            <a:ext cx="1503124" cy="646331"/>
+          </a:xfrm>
+          <a:prstGeom prst="rect">
+            <a:avLst/>
+          </a:prstGeom>
+          <a:noFill/>
+        </p:spPr>
+        <p:txBody>
+          <a:bodyPr wrap="square" rtlCol="0">
+            <a:spAutoFit/>
+          </a:bodyPr>
+          <a:lstStyle/>
+          <a:p>
+            <a:r>
+              <a:rPr lang="en-US" dirty="0" smtClean="0">
+                <a:solidFill>
+                  <a:srgbClr val="FF0000"/>
+                </a:solidFill>
+              </a:rPr>
+              <a:t>Buoy</a:t>
+            </a:r>
+          </a:p>
+          <a:p>
+            <a:r>
+              <a:rPr lang="en-US" dirty="0" smtClean="0">
+                <a:solidFill>
+                  <a:srgbClr val="0070C0"/>
+                </a:solidFill>
+              </a:rPr>
+              <a:t>Satellite</a:t>
+            </a:r>
+            <a:endParaRPr lang="en-US" dirty="0">
+              <a:solidFill>
+                <a:srgbClr val="0070C0"/>
+              </a:solidFill>
+            </a:endParaRPr>
+          </a:p>
+        </p:txBody>
+      </p:sp>
+    </p:spTree>
+    <p:extLst>
+      <p:ext uri="{BB962C8B-B14F-4D97-AF65-F5344CB8AC3E}">
+        <p14:creationId xmlns:p14="http://schemas.microsoft.com/office/powerpoint/2010/main" val="1621046595"/>
+      </p:ext>
+    </p:extLst>
+  </p:cSld>
+  <p:clrMapOvr>
+    <a:masterClrMapping/>
+  </p:clrMapOvr>
+  <p:timing>
+    <p:tnLst>
+      <p:par>
+        <p:cTn id="1" dur="indefinite" restart="never" nodeType="tmRoot"/>
+      </p:par>
+    </p:tnLst>
+  </p:timing>
+</p:sld>
+</file>
+
+<file path=ppt/slides/slide15.xml><?xml version="1.0" encoding="utf-8"?>
+<p:sld xmlns:a="http://schemas.openxmlformats.org/drawingml/2006/main" xmlns:r="http://schemas.openxmlformats.org/officeDocument/2006/relationships" xmlns:p="http://schemas.openxmlformats.org/presentationml/2006/main">
+  <p:cSld>
+    <p:spTree>
+      <p:nvGrpSpPr>
+        <p:cNvPr id="1" name=""/>
+        <p:cNvGrpSpPr/>
+        <p:nvPr/>
+      </p:nvGrpSpPr>
+      <p:grpSpPr>
+        <a:xfrm>
+          <a:off x="0" y="0"/>
+          <a:ext cx="0" cy="0"/>
+          <a:chOff x="0" y="0"/>
+          <a:chExt cx="0" cy="0"/>
+        </a:xfrm>
+      </p:grpSpPr>
+      <p:sp>
+        <p:nvSpPr>
+          <p:cNvPr id="2" name="Title 1"/>
+          <p:cNvSpPr>
+            <a:spLocks noGrp="1"/>
+          </p:cNvSpPr>
+          <p:nvPr>
+            <p:ph type="title"/>
+          </p:nvPr>
+        </p:nvSpPr>
+        <p:spPr/>
+        <p:txBody>
+          <a:bodyPr/>
+          <a:lstStyle/>
+          <a:p>
+            <a:r>
+              <a:rPr lang="en-US" dirty="0" smtClean="0"/>
+              <a:t>Conclusions</a:t>
+            </a:r>
+            <a:endParaRPr lang="en-US" dirty="0"/>
+          </a:p>
+        </p:txBody>
+      </p:sp>
+      <p:sp>
+        <p:nvSpPr>
+          <p:cNvPr id="3" name="Content Placeholder 2"/>
+          <p:cNvSpPr>
+            <a:spLocks noGrp="1"/>
+          </p:cNvSpPr>
+          <p:nvPr>
+            <p:ph idx="1"/>
+          </p:nvPr>
+        </p:nvSpPr>
+        <p:spPr/>
+        <p:txBody>
+          <a:bodyPr/>
+          <a:lstStyle/>
+          <a:p>
+            <a:r>
+              <a:rPr lang="en-US" b="1" dirty="0" smtClean="0"/>
+              <a:t>A random forest model of satellite indices performed only slightly worse than a model trained on buoy data.</a:t>
+            </a:r>
+          </a:p>
+          <a:p>
+            <a:r>
+              <a:rPr lang="en-US" b="1" dirty="0" smtClean="0"/>
+              <a:t>The best satellite index to use is the modified anthocyanin reflectance index.</a:t>
+            </a:r>
+          </a:p>
+          <a:p>
+            <a:r>
+              <a:rPr lang="en-US" b="1" dirty="0" smtClean="0"/>
+              <a:t>The strongest instantaneous predictor of </a:t>
+            </a:r>
+            <a:r>
+              <a:rPr lang="en-US" b="1" dirty="0" err="1" smtClean="0"/>
+              <a:t>phycocyanin</a:t>
+            </a:r>
+            <a:r>
+              <a:rPr lang="en-US" b="1" dirty="0" smtClean="0"/>
+              <a:t> was pH</a:t>
+            </a:r>
+          </a:p>
+          <a:p>
+            <a:r>
+              <a:rPr lang="en-US" b="1" dirty="0" smtClean="0"/>
+              <a:t>Neural networks did not accurately predict </a:t>
+            </a:r>
+            <a:r>
+              <a:rPr lang="en-US" b="1" dirty="0" err="1" smtClean="0"/>
+              <a:t>phycocyanin</a:t>
+            </a:r>
+            <a:r>
+              <a:rPr lang="en-US" b="1" dirty="0" smtClean="0"/>
+              <a:t> or chlorophyll a reflectance.</a:t>
+            </a:r>
+          </a:p>
+          <a:p>
+            <a:endParaRPr lang="en-US" b="1" dirty="0"/>
+          </a:p>
+        </p:txBody>
+      </p:sp>
+      <p:pic>
+        <p:nvPicPr>
+          <p:cNvPr id="4" name="Picture 3"/>
+          <p:cNvPicPr>
+            <a:picLocks noChangeAspect="1"/>
+          </p:cNvPicPr>
+          <p:nvPr/>
+        </p:nvPicPr>
+        <p:blipFill>
+          <a:blip r:embed="rId2"/>
+          <a:stretch>
+            <a:fillRect/>
+          </a:stretch>
+        </p:blipFill>
+        <p:spPr>
+          <a:xfrm>
+            <a:off x="978408" y="4232148"/>
+            <a:ext cx="10067925" cy="990600"/>
+          </a:xfrm>
+          <a:prstGeom prst="rect">
+            <a:avLst/>
+          </a:prstGeom>
+        </p:spPr>
+      </p:pic>
+    </p:spTree>
+    <p:extLst>
+      <p:ext uri="{BB962C8B-B14F-4D97-AF65-F5344CB8AC3E}">
+        <p14:creationId xmlns:p14="http://schemas.microsoft.com/office/powerpoint/2010/main" val="2925572586"/>
+      </p:ext>
+    </p:extLst>
+  </p:cSld>
+  <p:clrMapOvr>
+    <a:masterClrMapping/>
+  </p:clrMapOvr>
+  <p:timing>
+    <p:tnLst>
+      <p:par>
+        <p:cTn id="1" dur="indefinite" restart="never" nodeType="tmRoot"/>
+      </p:par>
+    </p:tnLst>
+  </p:timing>
+</p:sld>
+</file>
+
+<file path=ppt/slides/slide16.xml><?xml version="1.0" encoding="utf-8"?>
+<p:sld xmlns:a="http://schemas.openxmlformats.org/drawingml/2006/main" xmlns:r="http://schemas.openxmlformats.org/officeDocument/2006/relationships" xmlns:p="http://schemas.openxmlformats.org/presentationml/2006/main">
+  <p:cSld>
+    <p:spTree>
+      <p:nvGrpSpPr>
+        <p:cNvPr id="1" name=""/>
+        <p:cNvGrpSpPr/>
+        <p:nvPr/>
+      </p:nvGrpSpPr>
+      <p:grpSpPr>
+        <a:xfrm>
+          <a:off x="0" y="0"/>
+          <a:ext cx="0" cy="0"/>
+          <a:chOff x="0" y="0"/>
+          <a:chExt cx="0" cy="0"/>
+        </a:xfrm>
+      </p:grpSpPr>
+      <p:sp>
+        <p:nvSpPr>
+          <p:cNvPr id="2" name="Title 1"/>
+          <p:cNvSpPr>
+            <a:spLocks noGrp="1"/>
+          </p:cNvSpPr>
+          <p:nvPr>
+            <p:ph type="title"/>
+          </p:nvPr>
+        </p:nvSpPr>
+        <p:spPr/>
+        <p:txBody>
+          <a:bodyPr/>
+          <a:lstStyle/>
+          <a:p>
+            <a:r>
+              <a:rPr lang="en-US" dirty="0" smtClean="0"/>
+              <a:t>Future Questions</a:t>
+            </a:r>
+            <a:endParaRPr lang="en-US" dirty="0"/>
+          </a:p>
+        </p:txBody>
+      </p:sp>
+      <p:sp>
+        <p:nvSpPr>
+          <p:cNvPr id="3" name="Content Placeholder 2"/>
+          <p:cNvSpPr>
+            <a:spLocks noGrp="1"/>
+          </p:cNvSpPr>
+          <p:nvPr>
+            <p:ph idx="1"/>
+          </p:nvPr>
+        </p:nvSpPr>
+        <p:spPr/>
+        <p:txBody>
+          <a:bodyPr/>
+          <a:lstStyle/>
+          <a:p>
+            <a:r>
+              <a:rPr lang="en-US" b="1" dirty="0" smtClean="0"/>
+              <a:t>Does lagging the data by a few days improve predictions?</a:t>
+            </a:r>
+          </a:p>
+          <a:p>
+            <a:r>
+              <a:rPr lang="en-US" b="1" dirty="0" smtClean="0"/>
+              <a:t>Are other satellite sensors more effective?</a:t>
+            </a:r>
+          </a:p>
+          <a:p>
+            <a:pPr lvl="1"/>
+            <a:r>
+              <a:rPr lang="en-US" b="1" dirty="0" smtClean="0"/>
+              <a:t>S3 OLCI</a:t>
+            </a:r>
+            <a:endParaRPr lang="en-US" b="1" dirty="0" smtClean="0"/>
+          </a:p>
+          <a:p>
+            <a:endParaRPr lang="en-US" b="1" dirty="0"/>
+          </a:p>
+        </p:txBody>
+      </p:sp>
+    </p:spTree>
+    <p:extLst>
+      <p:ext uri="{BB962C8B-B14F-4D97-AF65-F5344CB8AC3E}">
+        <p14:creationId xmlns:p14="http://schemas.microsoft.com/office/powerpoint/2010/main" val="3709451000"/>
+      </p:ext>
+    </p:extLst>
+  </p:cSld>
+  <p:clrMapOvr>
+    <a:masterClrMapping/>
+  </p:clrMapOvr>
+  <p:timing>
+    <p:tnLst>
+      <p:par>
+        <p:cTn id="1" dur="indefinite" restart="never" nodeType="tmRoot"/>
+      </p:par>
+    </p:tnLst>
+  </p:timing>
 </p:sld>
 </file>
 
@@ -4001,8 +5022,13 @@
           <a:p>
             <a:r>
               <a:rPr lang="en-US" dirty="0" smtClean="0"/>
-              <a:t>Study Area: SW Lake Erie</a:t>
-            </a:r>
+              <a:t>Study Area: SW Lake </a:t>
+            </a:r>
+            <a:r>
+              <a:rPr lang="en-US" dirty="0" smtClean="0"/>
+              <a:t>Erie, Maumee river</a:t>
+            </a:r>
+            <a:endParaRPr lang="en-US" dirty="0" smtClean="0"/>
           </a:p>
           <a:p>
             <a:pPr lvl="1"/>
@@ -4054,6 +5080,13 @@
   <p:clrMapOvr>
     <a:masterClrMapping/>
   </p:clrMapOvr>
+  <p:timing>
+    <p:tnLst>
+      <p:par>
+        <p:cTn id="1" dur="indefinite" restart="never" nodeType="tmRoot"/>
+      </p:par>
+    </p:tnLst>
+  </p:timing>
 </p:sld>
 </file>
 
@@ -4091,7 +5124,7 @@
           <a:p>
             <a:r>
               <a:rPr lang="en-US" dirty="0" smtClean="0"/>
-              <a:t>Data</a:t>
+              <a:t>Data Source</a:t>
             </a:r>
             <a:endParaRPr lang="en-US" dirty="0"/>
           </a:p>
@@ -4114,7 +5147,7 @@
           <a:p>
             <a:r>
               <a:rPr lang="en-US" dirty="0" smtClean="0"/>
-              <a:t>Data from HAB stations publically available from NOAA (2014-present)</a:t>
+              <a:t>HAB stations publically available from NOAA (2014-present)</a:t>
             </a:r>
           </a:p>
           <a:p>
@@ -4170,7 +5203,7 @@
                   </a:prstClr>
                 </a:solidFill>
               </a:rPr>
-              <a:t>Possible problems</a:t>
+              <a:t>Issues faced</a:t>
             </a:r>
           </a:p>
           <a:p>
@@ -4188,7 +5221,7 @@
                   </a:prstClr>
                 </a:solidFill>
               </a:rPr>
-              <a:t>Joining field data results in few observations – 649 becomes 24</a:t>
+              <a:t>No direct measurement of cyanobacteria cell counts</a:t>
             </a:r>
           </a:p>
           <a:p>
@@ -4206,7 +5239,7 @@
                   </a:prstClr>
                 </a:solidFill>
               </a:rPr>
-              <a:t>Buoy data and field data not comparable b/c of differing units</a:t>
+              <a:t>Instrument package changed year to year</a:t>
             </a:r>
             <a:endParaRPr lang="en-US" dirty="0" smtClean="0"/>
           </a:p>
@@ -4235,8 +5268,8 @@
         </p:blipFill>
         <p:spPr bwMode="auto">
           <a:xfrm>
-            <a:off x="7396998" y="2371786"/>
-            <a:ext cx="3758682" cy="2114259"/>
+            <a:off x="7067813" y="2490658"/>
+            <a:ext cx="4626755" cy="2602550"/>
           </a:xfrm>
           <a:prstGeom prst="rect">
             <a:avLst/>
@@ -4263,6 +5296,13 @@
   <p:clrMapOvr>
     <a:masterClrMapping/>
   </p:clrMapOvr>
+  <p:timing>
+    <p:tnLst>
+      <p:par>
+        <p:cTn id="1" dur="indefinite" restart="never" nodeType="tmRoot"/>
+      </p:par>
+    </p:tnLst>
+  </p:timing>
 </p:sld>
 </file>
 
@@ -4283,81 +5323,991 @@
           <a:chExt cx="0" cy="0"/>
         </a:xfrm>
       </p:grpSpPr>
-      <p:sp>
-        <p:nvSpPr>
-          <p:cNvPr id="2" name="Title 1"/>
-          <p:cNvSpPr>
-            <a:spLocks noGrp="1"/>
-          </p:cNvSpPr>
-          <p:nvPr>
-            <p:ph type="title"/>
-          </p:nvPr>
-        </p:nvSpPr>
-        <p:spPr/>
-        <p:txBody>
-          <a:bodyPr/>
-          <a:lstStyle/>
-          <a:p>
-            <a:r>
-              <a:rPr lang="en-US" dirty="0" smtClean="0"/>
-              <a:t>Goals</a:t>
-            </a:r>
-            <a:endParaRPr lang="en-US" dirty="0"/>
-          </a:p>
-        </p:txBody>
-      </p:sp>
-      <p:sp>
-        <p:nvSpPr>
-          <p:cNvPr id="3" name="Content Placeholder 2"/>
-          <p:cNvSpPr>
-            <a:spLocks noGrp="1"/>
-          </p:cNvSpPr>
-          <p:nvPr>
-            <p:ph idx="1"/>
-          </p:nvPr>
-        </p:nvSpPr>
-        <p:spPr/>
-        <p:txBody>
-          <a:bodyPr/>
-          <a:lstStyle/>
-          <a:p>
-            <a:r>
-              <a:rPr lang="en-US" dirty="0" smtClean="0"/>
-              <a:t>Determine band combinations most useful for detecting HABs</a:t>
-            </a:r>
-          </a:p>
-          <a:p>
-            <a:r>
-              <a:rPr lang="en-US" dirty="0" smtClean="0"/>
-              <a:t>Use turbidity measurements to prevent conflating turbid water with algae blooms</a:t>
-            </a:r>
-          </a:p>
-          <a:p>
-            <a:r>
-              <a:rPr lang="en-US" dirty="0" smtClean="0"/>
-              <a:t>Generalize the model to nearby pixels in SW </a:t>
-            </a:r>
-            <a:r>
-              <a:rPr lang="en-US" smtClean="0"/>
-              <a:t>Lake Erie</a:t>
-            </a:r>
-            <a:endParaRPr lang="en-US" dirty="0" smtClean="0"/>
-          </a:p>
-          <a:p>
-            <a:endParaRPr lang="en-US" dirty="0"/>
-          </a:p>
-        </p:txBody>
-      </p:sp>
+      <p:pic>
+        <p:nvPicPr>
+          <p:cNvPr id="4" name="Picture 2" descr="1: Typical spectral reflectance curves for vegetation, soil, and water... |  Download Scientific Diagram"/>
+          <p:cNvPicPr>
+            <a:picLocks noChangeAspect="1" noChangeArrowheads="1"/>
+          </p:cNvPicPr>
+          <p:nvPr/>
+        </p:nvPicPr>
+        <p:blipFill>
+          <a:blip r:embed="rId2">
+            <a:extLst>
+              <a:ext uri="{28A0092B-C50C-407E-A947-70E740481C1C}">
+                <a14:useLocalDpi xmlns:a14="http://schemas.microsoft.com/office/drawing/2010/main" val="0"/>
+              </a:ext>
+            </a:extLst>
+          </a:blip>
+          <a:srcRect/>
+          <a:stretch>
+            <a:fillRect/>
+          </a:stretch>
+        </p:blipFill>
+        <p:spPr bwMode="auto">
+          <a:xfrm>
+            <a:off x="809897" y="0"/>
+            <a:ext cx="10672354" cy="6240188"/>
+          </a:xfrm>
+          <a:prstGeom prst="rect">
+            <a:avLst/>
+          </a:prstGeom>
+          <a:noFill/>
+          <a:extLst>
+            <a:ext uri="{909E8E84-426E-40DD-AFC4-6F175D3DCCD1}">
+              <a14:hiddenFill xmlns:a14="http://schemas.microsoft.com/office/drawing/2010/main">
+                <a:solidFill>
+                  <a:srgbClr val="FFFFFF"/>
+                </a:solidFill>
+              </a14:hiddenFill>
+            </a:ext>
+          </a:extLst>
+        </p:spPr>
+      </p:pic>
+      <p:sp>
+        <p:nvSpPr>
+          <p:cNvPr id="5" name="TextBox 4"/>
+          <p:cNvSpPr txBox="1"/>
+          <p:nvPr/>
+        </p:nvSpPr>
+        <p:spPr>
+          <a:xfrm>
+            <a:off x="4467496" y="3794761"/>
+            <a:ext cx="1854926" cy="523220"/>
+          </a:xfrm>
+          <a:prstGeom prst="rect">
+            <a:avLst/>
+          </a:prstGeom>
+          <a:noFill/>
+        </p:spPr>
+        <p:txBody>
+          <a:bodyPr wrap="square" rtlCol="0">
+            <a:spAutoFit/>
+          </a:bodyPr>
+          <a:lstStyle/>
+          <a:p>
+            <a:pPr algn="ctr"/>
+            <a:r>
+              <a:rPr lang="en-US" sz="2800" b="1" dirty="0" smtClean="0">
+                <a:solidFill>
+                  <a:srgbClr val="FF0000"/>
+                </a:solidFill>
+              </a:rPr>
+              <a:t>B10</a:t>
+            </a:r>
+            <a:endParaRPr lang="en-US" sz="2800" b="1" dirty="0">
+              <a:solidFill>
+                <a:srgbClr val="FF0000"/>
+              </a:solidFill>
+            </a:endParaRPr>
+          </a:p>
+        </p:txBody>
+      </p:sp>
+      <p:sp>
+        <p:nvSpPr>
+          <p:cNvPr id="6" name="TextBox 5"/>
+          <p:cNvSpPr txBox="1"/>
+          <p:nvPr/>
+        </p:nvSpPr>
+        <p:spPr>
+          <a:xfrm>
+            <a:off x="1675528" y="5716968"/>
+            <a:ext cx="1854926" cy="523220"/>
+          </a:xfrm>
+          <a:prstGeom prst="rect">
+            <a:avLst/>
+          </a:prstGeom>
+          <a:noFill/>
+        </p:spPr>
+        <p:txBody>
+          <a:bodyPr wrap="square" rtlCol="0">
+            <a:spAutoFit/>
+          </a:bodyPr>
+          <a:lstStyle/>
+          <a:p>
+            <a:pPr algn="ctr"/>
+            <a:r>
+              <a:rPr lang="en-US" sz="2800" b="1" dirty="0" smtClean="0">
+                <a:solidFill>
+                  <a:srgbClr val="FF0000"/>
+                </a:solidFill>
+              </a:rPr>
+              <a:t>Bands 1-9</a:t>
+            </a:r>
+            <a:endParaRPr lang="en-US" sz="2800" b="1" dirty="0">
+              <a:solidFill>
+                <a:srgbClr val="FF0000"/>
+              </a:solidFill>
+            </a:endParaRPr>
+          </a:p>
+        </p:txBody>
+      </p:sp>
+      <p:cxnSp>
+        <p:nvCxnSpPr>
+          <p:cNvPr id="7" name="Straight Arrow Connector 6"/>
+          <p:cNvCxnSpPr/>
+          <p:nvPr/>
+        </p:nvCxnSpPr>
+        <p:spPr>
+          <a:xfrm>
+            <a:off x="5381897" y="4317274"/>
+            <a:ext cx="489857" cy="548640"/>
+          </a:xfrm>
+          <a:prstGeom prst="straightConnector1">
+            <a:avLst/>
+          </a:prstGeom>
+          <a:ln w="38100">
+            <a:solidFill>
+              <a:srgbClr val="FF0000"/>
+            </a:solidFill>
+            <a:tailEnd type="triangle"/>
+          </a:ln>
+        </p:spPr>
+        <p:style>
+          <a:lnRef idx="1">
+            <a:schemeClr val="dk1"/>
+          </a:lnRef>
+          <a:fillRef idx="0">
+            <a:schemeClr val="dk1"/>
+          </a:fillRef>
+          <a:effectRef idx="0">
+            <a:schemeClr val="dk1"/>
+          </a:effectRef>
+          <a:fontRef idx="minor">
+            <a:schemeClr val="tx1"/>
+          </a:fontRef>
+        </p:style>
+      </p:cxnSp>
+      <p:sp>
+        <p:nvSpPr>
+          <p:cNvPr id="8" name="TextBox 7"/>
+          <p:cNvSpPr txBox="1"/>
+          <p:nvPr/>
+        </p:nvSpPr>
+        <p:spPr>
+          <a:xfrm>
+            <a:off x="8366760" y="3865900"/>
+            <a:ext cx="1854926" cy="523220"/>
+          </a:xfrm>
+          <a:prstGeom prst="rect">
+            <a:avLst/>
+          </a:prstGeom>
+          <a:noFill/>
+        </p:spPr>
+        <p:txBody>
+          <a:bodyPr wrap="square" rtlCol="0">
+            <a:spAutoFit/>
+          </a:bodyPr>
+          <a:lstStyle/>
+          <a:p>
+            <a:pPr algn="ctr"/>
+            <a:r>
+              <a:rPr lang="en-US" sz="2800" b="1" dirty="0" smtClean="0">
+                <a:solidFill>
+                  <a:srgbClr val="FF0000"/>
+                </a:solidFill>
+              </a:rPr>
+              <a:t>B12</a:t>
+            </a:r>
+            <a:endParaRPr lang="en-US" sz="2800" b="1" dirty="0">
+              <a:solidFill>
+                <a:srgbClr val="FF0000"/>
+              </a:solidFill>
+            </a:endParaRPr>
+          </a:p>
+        </p:txBody>
+      </p:sp>
+      <p:cxnSp>
+        <p:nvCxnSpPr>
+          <p:cNvPr id="9" name="Straight Arrow Connector 8"/>
+          <p:cNvCxnSpPr/>
+          <p:nvPr/>
+        </p:nvCxnSpPr>
+        <p:spPr>
+          <a:xfrm>
+            <a:off x="6651172" y="4278085"/>
+            <a:ext cx="376645" cy="587829"/>
+          </a:xfrm>
+          <a:prstGeom prst="straightConnector1">
+            <a:avLst/>
+          </a:prstGeom>
+          <a:ln w="38100">
+            <a:solidFill>
+              <a:srgbClr val="FF0000"/>
+            </a:solidFill>
+            <a:tailEnd type="triangle"/>
+          </a:ln>
+        </p:spPr>
+        <p:style>
+          <a:lnRef idx="1">
+            <a:schemeClr val="dk1"/>
+          </a:lnRef>
+          <a:fillRef idx="0">
+            <a:schemeClr val="dk1"/>
+          </a:fillRef>
+          <a:effectRef idx="0">
+            <a:schemeClr val="dk1"/>
+          </a:effectRef>
+          <a:fontRef idx="minor">
+            <a:schemeClr val="tx1"/>
+          </a:fontRef>
+        </p:style>
+      </p:cxnSp>
+      <p:sp>
+        <p:nvSpPr>
+          <p:cNvPr id="10" name="TextBox 9"/>
+          <p:cNvSpPr txBox="1"/>
+          <p:nvPr/>
+        </p:nvSpPr>
+        <p:spPr>
+          <a:xfrm>
+            <a:off x="5723709" y="3813649"/>
+            <a:ext cx="1854926" cy="523220"/>
+          </a:xfrm>
+          <a:prstGeom prst="rect">
+            <a:avLst/>
+          </a:prstGeom>
+          <a:noFill/>
+        </p:spPr>
+        <p:txBody>
+          <a:bodyPr wrap="square" rtlCol="0">
+            <a:spAutoFit/>
+          </a:bodyPr>
+          <a:lstStyle/>
+          <a:p>
+            <a:pPr algn="ctr"/>
+            <a:r>
+              <a:rPr lang="en-US" sz="2800" b="1" dirty="0" smtClean="0">
+                <a:solidFill>
+                  <a:srgbClr val="FF0000"/>
+                </a:solidFill>
+              </a:rPr>
+              <a:t>B11</a:t>
+            </a:r>
+            <a:endParaRPr lang="en-US" sz="2800" b="1" dirty="0">
+              <a:solidFill>
+                <a:srgbClr val="FF0000"/>
+              </a:solidFill>
+            </a:endParaRPr>
+          </a:p>
+        </p:txBody>
+      </p:sp>
+      <p:cxnSp>
+        <p:nvCxnSpPr>
+          <p:cNvPr id="11" name="Straight Arrow Connector 10"/>
+          <p:cNvCxnSpPr/>
+          <p:nvPr/>
+        </p:nvCxnSpPr>
+        <p:spPr>
+          <a:xfrm>
+            <a:off x="9294223" y="4297679"/>
+            <a:ext cx="104503" cy="568235"/>
+          </a:xfrm>
+          <a:prstGeom prst="straightConnector1">
+            <a:avLst/>
+          </a:prstGeom>
+          <a:ln w="38100">
+            <a:solidFill>
+              <a:srgbClr val="FF0000"/>
+            </a:solidFill>
+            <a:tailEnd type="triangle"/>
+          </a:ln>
+        </p:spPr>
+        <p:style>
+          <a:lnRef idx="1">
+            <a:schemeClr val="dk1"/>
+          </a:lnRef>
+          <a:fillRef idx="0">
+            <a:schemeClr val="dk1"/>
+          </a:fillRef>
+          <a:effectRef idx="0">
+            <a:schemeClr val="dk1"/>
+          </a:effectRef>
+          <a:fontRef idx="minor">
+            <a:schemeClr val="tx1"/>
+          </a:fontRef>
+        </p:style>
+      </p:cxnSp>
     </p:spTree>
     <p:extLst>
       <p:ext uri="{BB962C8B-B14F-4D97-AF65-F5344CB8AC3E}">
-        <p14:creationId xmlns:p14="http://schemas.microsoft.com/office/powerpoint/2010/main" val="1106690366"/>
+        <p14:creationId xmlns:p14="http://schemas.microsoft.com/office/powerpoint/2010/main" val="2743506609"/>
       </p:ext>
     </p:extLst>
   </p:cSld>
   <p:clrMapOvr>
     <a:masterClrMapping/>
   </p:clrMapOvr>
+  <p:timing>
+    <p:tnLst>
+      <p:par>
+        <p:cTn id="1" dur="indefinite" restart="never" nodeType="tmRoot"/>
+      </p:par>
+    </p:tnLst>
+  </p:timing>
+</p:sld>
+</file>
+
+<file path=ppt/slides/slide5.xml><?xml version="1.0" encoding="utf-8"?>
+<p:sld xmlns:a="http://schemas.openxmlformats.org/drawingml/2006/main" xmlns:r="http://schemas.openxmlformats.org/officeDocument/2006/relationships" xmlns:p="http://schemas.openxmlformats.org/presentationml/2006/main">
+  <p:cSld>
+    <p:spTree>
+      <p:nvGrpSpPr>
+        <p:cNvPr id="1" name=""/>
+        <p:cNvGrpSpPr/>
+        <p:nvPr/>
+      </p:nvGrpSpPr>
+      <p:grpSpPr>
+        <a:xfrm>
+          <a:off x="0" y="0"/>
+          <a:ext cx="0" cy="0"/>
+          <a:chOff x="0" y="0"/>
+          <a:chExt cx="0" cy="0"/>
+        </a:xfrm>
+      </p:grpSpPr>
+      <p:sp>
+        <p:nvSpPr>
+          <p:cNvPr id="2" name="Title 1"/>
+          <p:cNvSpPr>
+            <a:spLocks noGrp="1"/>
+          </p:cNvSpPr>
+          <p:nvPr>
+            <p:ph type="title"/>
+          </p:nvPr>
+        </p:nvSpPr>
+        <p:spPr/>
+        <p:txBody>
+          <a:bodyPr/>
+          <a:lstStyle/>
+          <a:p>
+            <a:r>
+              <a:rPr lang="en-US" dirty="0" smtClean="0"/>
+              <a:t>Questions to answer</a:t>
+            </a:r>
+            <a:endParaRPr lang="en-US" dirty="0"/>
+          </a:p>
+        </p:txBody>
+      </p:sp>
+      <p:sp>
+        <p:nvSpPr>
+          <p:cNvPr id="3" name="Content Placeholder 2"/>
+          <p:cNvSpPr>
+            <a:spLocks noGrp="1"/>
+          </p:cNvSpPr>
+          <p:nvPr>
+            <p:ph idx="1"/>
+          </p:nvPr>
+        </p:nvSpPr>
+        <p:spPr/>
+        <p:txBody>
+          <a:bodyPr>
+            <a:normAutofit/>
+          </a:bodyPr>
+          <a:lstStyle/>
+          <a:p>
+            <a:r>
+              <a:rPr lang="en-US" sz="2800" b="1" dirty="0" smtClean="0"/>
+              <a:t>Can satellite data be used in place of buoy data to model algae occurrence?</a:t>
+            </a:r>
+          </a:p>
+          <a:p>
+            <a:endParaRPr lang="en-US" sz="2800" b="1" dirty="0"/>
+          </a:p>
+          <a:p>
+            <a:r>
+              <a:rPr lang="en-US" sz="2800" b="1" dirty="0" smtClean="0"/>
+              <a:t>What combination of satellite bands is most effective for modeling algae?</a:t>
+            </a:r>
+            <a:endParaRPr lang="en-US" sz="2800" b="1" dirty="0"/>
+          </a:p>
+        </p:txBody>
+      </p:sp>
+    </p:spTree>
+    <p:extLst>
+      <p:ext uri="{BB962C8B-B14F-4D97-AF65-F5344CB8AC3E}">
+        <p14:creationId xmlns:p14="http://schemas.microsoft.com/office/powerpoint/2010/main" val="434676568"/>
+      </p:ext>
+    </p:extLst>
+  </p:cSld>
+  <p:clrMapOvr>
+    <a:masterClrMapping/>
+  </p:clrMapOvr>
+  <p:timing>
+    <p:tnLst>
+      <p:par>
+        <p:cTn id="1" dur="indefinite" restart="never" nodeType="tmRoot"/>
+      </p:par>
+    </p:tnLst>
+  </p:timing>
+</p:sld>
+</file>
+
+<file path=ppt/slides/slide6.xml><?xml version="1.0" encoding="utf-8"?>
+<p:sld xmlns:a="http://schemas.openxmlformats.org/drawingml/2006/main" xmlns:r="http://schemas.openxmlformats.org/officeDocument/2006/relationships" xmlns:p="http://schemas.openxmlformats.org/presentationml/2006/main">
+  <p:cSld>
+    <p:spTree>
+      <p:nvGrpSpPr>
+        <p:cNvPr id="1" name=""/>
+        <p:cNvGrpSpPr/>
+        <p:nvPr/>
+      </p:nvGrpSpPr>
+      <p:grpSpPr>
+        <a:xfrm>
+          <a:off x="0" y="0"/>
+          <a:ext cx="0" cy="0"/>
+          <a:chOff x="0" y="0"/>
+          <a:chExt cx="0" cy="0"/>
+        </a:xfrm>
+      </p:grpSpPr>
+      <p:sp>
+        <p:nvSpPr>
+          <p:cNvPr id="2" name="Title 1"/>
+          <p:cNvSpPr>
+            <a:spLocks noGrp="1"/>
+          </p:cNvSpPr>
+          <p:nvPr>
+            <p:ph type="title"/>
+          </p:nvPr>
+        </p:nvSpPr>
+        <p:spPr/>
+        <p:txBody>
+          <a:bodyPr/>
+          <a:lstStyle/>
+          <a:p>
+            <a:r>
+              <a:rPr lang="en-US" dirty="0" smtClean="0"/>
+              <a:t>Observations include some green, are these HABs?</a:t>
+            </a:r>
+            <a:endParaRPr lang="en-US" dirty="0"/>
+          </a:p>
+        </p:txBody>
+      </p:sp>
+      <p:sp>
+        <p:nvSpPr>
+          <p:cNvPr id="3" name="Content Placeholder 2"/>
+          <p:cNvSpPr>
+            <a:spLocks noGrp="1"/>
+          </p:cNvSpPr>
+          <p:nvPr>
+            <p:ph idx="1"/>
+          </p:nvPr>
+        </p:nvSpPr>
+        <p:spPr/>
+        <p:txBody>
+          <a:bodyPr/>
+          <a:lstStyle/>
+          <a:p>
+            <a:endParaRPr lang="en-US"/>
+          </a:p>
+        </p:txBody>
+      </p:sp>
+      <p:pic>
+        <p:nvPicPr>
+          <p:cNvPr id="4" name="Picture 3"/>
+          <p:cNvPicPr>
+            <a:picLocks noChangeAspect="1"/>
+          </p:cNvPicPr>
+          <p:nvPr/>
+        </p:nvPicPr>
+        <p:blipFill rotWithShape="1">
+          <a:blip r:embed="rId2">
+            <a:extLst>
+              <a:ext uri="{BEBA8EAE-BF5A-486C-A8C5-ECC9F3942E4B}">
+                <a14:imgProps xmlns:a14="http://schemas.microsoft.com/office/drawing/2010/main">
+                  <a14:imgLayer r:embed="rId3">
+                    <a14:imgEffect>
+                      <a14:brightnessContrast bright="40000" contrast="40000"/>
+                    </a14:imgEffect>
+                  </a14:imgLayer>
+                </a14:imgProps>
+              </a:ext>
+            </a:extLst>
+          </a:blip>
+          <a:srcRect l="9215" t="12847" r="5373" b="16807"/>
+          <a:stretch/>
+        </p:blipFill>
+        <p:spPr>
+          <a:xfrm>
+            <a:off x="2532888" y="1845734"/>
+            <a:ext cx="7187184" cy="4352102"/>
+          </a:xfrm>
+          <a:prstGeom prst="rect">
+            <a:avLst/>
+          </a:prstGeom>
+        </p:spPr>
+      </p:pic>
+    </p:spTree>
+    <p:extLst>
+      <p:ext uri="{BB962C8B-B14F-4D97-AF65-F5344CB8AC3E}">
+        <p14:creationId xmlns:p14="http://schemas.microsoft.com/office/powerpoint/2010/main" val="832418803"/>
+      </p:ext>
+    </p:extLst>
+  </p:cSld>
+  <p:clrMapOvr>
+    <a:masterClrMapping/>
+  </p:clrMapOvr>
+  <p:timing>
+    <p:tnLst>
+      <p:par>
+        <p:cTn id="1" dur="indefinite" restart="never" nodeType="tmRoot"/>
+      </p:par>
+    </p:tnLst>
+  </p:timing>
+</p:sld>
+</file>
+
+<file path=ppt/slides/slide7.xml><?xml version="1.0" encoding="utf-8"?>
+<p:sld xmlns:a="http://schemas.openxmlformats.org/drawingml/2006/main" xmlns:r="http://schemas.openxmlformats.org/officeDocument/2006/relationships" xmlns:p="http://schemas.openxmlformats.org/presentationml/2006/main">
+  <p:cSld>
+    <p:spTree>
+      <p:nvGrpSpPr>
+        <p:cNvPr id="1" name=""/>
+        <p:cNvGrpSpPr/>
+        <p:nvPr/>
+      </p:nvGrpSpPr>
+      <p:grpSpPr>
+        <a:xfrm>
+          <a:off x="0" y="0"/>
+          <a:ext cx="0" cy="0"/>
+          <a:chOff x="0" y="0"/>
+          <a:chExt cx="0" cy="0"/>
+        </a:xfrm>
+      </p:grpSpPr>
+      <p:sp>
+        <p:nvSpPr>
+          <p:cNvPr id="2" name="Title 1"/>
+          <p:cNvSpPr>
+            <a:spLocks noGrp="1"/>
+          </p:cNvSpPr>
+          <p:nvPr>
+            <p:ph type="title"/>
+          </p:nvPr>
+        </p:nvSpPr>
+        <p:spPr/>
+        <p:txBody>
+          <a:bodyPr/>
+          <a:lstStyle/>
+          <a:p>
+            <a:endParaRPr lang="en-US" dirty="0"/>
+          </a:p>
+        </p:txBody>
+      </p:sp>
+      <p:pic>
+        <p:nvPicPr>
+          <p:cNvPr id="5" name="Content Placeholder 4"/>
+          <p:cNvPicPr>
+            <a:picLocks noGrp="1" noChangeAspect="1"/>
+          </p:cNvPicPr>
+          <p:nvPr>
+            <p:ph idx="1"/>
+          </p:nvPr>
+        </p:nvPicPr>
+        <p:blipFill>
+          <a:blip r:embed="rId2">
+            <a:extLst>
+              <a:ext uri="{28A0092B-C50C-407E-A947-70E740481C1C}">
+                <a14:useLocalDpi xmlns:a14="http://schemas.microsoft.com/office/drawing/2010/main" val="0"/>
+              </a:ext>
+            </a:extLst>
+          </a:blip>
+          <a:stretch>
+            <a:fillRect/>
+          </a:stretch>
+        </p:blipFill>
+        <p:spPr>
+          <a:xfrm>
+            <a:off x="-8624" y="658368"/>
+            <a:ext cx="12200624" cy="5212080"/>
+          </a:xfrm>
+        </p:spPr>
+      </p:pic>
+      <p:sp>
+        <p:nvSpPr>
+          <p:cNvPr id="6" name="TextBox 5"/>
+          <p:cNvSpPr txBox="1"/>
+          <p:nvPr/>
+        </p:nvSpPr>
+        <p:spPr>
+          <a:xfrm>
+            <a:off x="10250424" y="658368"/>
+            <a:ext cx="1941576" cy="369332"/>
+          </a:xfrm>
+          <a:prstGeom prst="rect">
+            <a:avLst/>
+          </a:prstGeom>
+          <a:noFill/>
+        </p:spPr>
+        <p:txBody>
+          <a:bodyPr wrap="square" rtlCol="0">
+            <a:spAutoFit/>
+          </a:bodyPr>
+          <a:lstStyle/>
+          <a:p>
+            <a:pPr algn="r"/>
+            <a:r>
+              <a:rPr lang="en-US" dirty="0" smtClean="0">
+                <a:solidFill>
+                  <a:schemeClr val="bg1"/>
+                </a:solidFill>
+              </a:rPr>
+              <a:t>2018-11-26</a:t>
+            </a:r>
+            <a:endParaRPr lang="en-US" dirty="0">
+              <a:solidFill>
+                <a:schemeClr val="bg1"/>
+              </a:solidFill>
+            </a:endParaRPr>
+          </a:p>
+        </p:txBody>
+      </p:sp>
+      <p:sp>
+        <p:nvSpPr>
+          <p:cNvPr id="7" name="Oval 6"/>
+          <p:cNvSpPr/>
+          <p:nvPr/>
+        </p:nvSpPr>
+        <p:spPr>
+          <a:xfrm>
+            <a:off x="5175504" y="4398264"/>
+            <a:ext cx="530352" cy="530352"/>
+          </a:xfrm>
+          <a:prstGeom prst="ellipse">
+            <a:avLst/>
+          </a:prstGeom>
+          <a:noFill/>
+          <a:ln>
+            <a:solidFill>
+              <a:srgbClr val="FF0000"/>
+            </a:solidFill>
+          </a:ln>
+        </p:spPr>
+        <p:style>
+          <a:lnRef idx="2">
+            <a:schemeClr val="accent1">
+              <a:shade val="50000"/>
+            </a:schemeClr>
+          </a:lnRef>
+          <a:fillRef idx="1">
+            <a:schemeClr val="accent1"/>
+          </a:fillRef>
+          <a:effectRef idx="0">
+            <a:schemeClr val="accent1"/>
+          </a:effectRef>
+          <a:fontRef idx="minor">
+            <a:schemeClr val="lt1"/>
+          </a:fontRef>
+        </p:style>
+        <p:txBody>
+          <a:bodyPr rtlCol="0" anchor="ctr"/>
+          <a:lstStyle/>
+          <a:p>
+            <a:pPr algn="ctr"/>
+            <a:endParaRPr lang="en-US"/>
+          </a:p>
+        </p:txBody>
+      </p:sp>
+      <p:sp>
+        <p:nvSpPr>
+          <p:cNvPr id="3" name="TextBox 2"/>
+          <p:cNvSpPr txBox="1"/>
+          <p:nvPr/>
+        </p:nvSpPr>
+        <p:spPr>
+          <a:xfrm>
+            <a:off x="5705856" y="4213598"/>
+            <a:ext cx="1452642" cy="369332"/>
+          </a:xfrm>
+          <a:prstGeom prst="rect">
+            <a:avLst/>
+          </a:prstGeom>
+          <a:noFill/>
+        </p:spPr>
+        <p:txBody>
+          <a:bodyPr wrap="none" rtlCol="0">
+            <a:spAutoFit/>
+          </a:bodyPr>
+          <a:lstStyle/>
+          <a:p>
+            <a:r>
+              <a:rPr lang="en-US" dirty="0" smtClean="0">
+                <a:solidFill>
+                  <a:srgbClr val="FF0000"/>
+                </a:solidFill>
+              </a:rPr>
+              <a:t>Is this a HAB?</a:t>
+            </a:r>
+            <a:endParaRPr lang="en-US" dirty="0">
+              <a:solidFill>
+                <a:srgbClr val="FF0000"/>
+              </a:solidFill>
+            </a:endParaRPr>
+          </a:p>
+        </p:txBody>
+      </p:sp>
+    </p:spTree>
+    <p:extLst>
+      <p:ext uri="{BB962C8B-B14F-4D97-AF65-F5344CB8AC3E}">
+        <p14:creationId xmlns:p14="http://schemas.microsoft.com/office/powerpoint/2010/main" val="2769669561"/>
+      </p:ext>
+    </p:extLst>
+  </p:cSld>
+  <p:clrMapOvr>
+    <a:masterClrMapping/>
+  </p:clrMapOvr>
+  <p:timing>
+    <p:tnLst>
+      <p:par>
+        <p:cTn id="1" dur="indefinite" restart="never" nodeType="tmRoot"/>
+      </p:par>
+    </p:tnLst>
+  </p:timing>
+</p:sld>
+</file>
+
+<file path=ppt/slides/slide8.xml><?xml version="1.0" encoding="utf-8"?>
+<p:sld xmlns:a="http://schemas.openxmlformats.org/drawingml/2006/main" xmlns:r="http://schemas.openxmlformats.org/officeDocument/2006/relationships" xmlns:p="http://schemas.openxmlformats.org/presentationml/2006/main">
+  <p:cSld>
+    <p:spTree>
+      <p:nvGrpSpPr>
+        <p:cNvPr id="1" name=""/>
+        <p:cNvGrpSpPr/>
+        <p:nvPr/>
+      </p:nvGrpSpPr>
+      <p:grpSpPr>
+        <a:xfrm>
+          <a:off x="0" y="0"/>
+          <a:ext cx="0" cy="0"/>
+          <a:chOff x="0" y="0"/>
+          <a:chExt cx="0" cy="0"/>
+        </a:xfrm>
+      </p:grpSpPr>
+      <p:sp>
+        <p:nvSpPr>
+          <p:cNvPr id="2" name="Title 1"/>
+          <p:cNvSpPr>
+            <a:spLocks noGrp="1"/>
+          </p:cNvSpPr>
+          <p:nvPr>
+            <p:ph type="title"/>
+          </p:nvPr>
+        </p:nvSpPr>
+        <p:spPr/>
+        <p:txBody>
+          <a:bodyPr/>
+          <a:lstStyle/>
+          <a:p>
+            <a:r>
+              <a:rPr lang="en-US" dirty="0" smtClean="0"/>
+              <a:t>Dimensionality reduction isn’t applicable due to almost perfect </a:t>
+            </a:r>
+            <a:r>
+              <a:rPr lang="en-US" dirty="0" err="1" smtClean="0"/>
+              <a:t>multicollinearity</a:t>
+            </a:r>
+            <a:endParaRPr lang="en-US" dirty="0"/>
+          </a:p>
+        </p:txBody>
+      </p:sp>
+      <p:sp>
+        <p:nvSpPr>
+          <p:cNvPr id="3" name="Content Placeholder 2"/>
+          <p:cNvSpPr>
+            <a:spLocks noGrp="1"/>
+          </p:cNvSpPr>
+          <p:nvPr>
+            <p:ph idx="1"/>
+          </p:nvPr>
+        </p:nvSpPr>
+        <p:spPr/>
+        <p:txBody>
+          <a:bodyPr/>
+          <a:lstStyle/>
+          <a:p>
+            <a:endParaRPr lang="en-US" dirty="0"/>
+          </a:p>
+        </p:txBody>
+      </p:sp>
+      <p:pic>
+        <p:nvPicPr>
+          <p:cNvPr id="4" name="Picture 3"/>
+          <p:cNvPicPr>
+            <a:picLocks noChangeAspect="1"/>
+          </p:cNvPicPr>
+          <p:nvPr/>
+        </p:nvPicPr>
+        <p:blipFill rotWithShape="1">
+          <a:blip r:embed="rId2"/>
+          <a:srcRect l="10360" r="6260"/>
+          <a:stretch/>
+        </p:blipFill>
+        <p:spPr>
+          <a:xfrm>
+            <a:off x="3845051" y="1845734"/>
+            <a:ext cx="4562857" cy="4023360"/>
+          </a:xfrm>
+          <a:prstGeom prst="rect">
+            <a:avLst/>
+          </a:prstGeom>
+        </p:spPr>
+      </p:pic>
+    </p:spTree>
+    <p:extLst>
+      <p:ext uri="{BB962C8B-B14F-4D97-AF65-F5344CB8AC3E}">
+        <p14:creationId xmlns:p14="http://schemas.microsoft.com/office/powerpoint/2010/main" val="541176977"/>
+      </p:ext>
+    </p:extLst>
+  </p:cSld>
+  <p:clrMapOvr>
+    <a:masterClrMapping/>
+  </p:clrMapOvr>
+  <p:timing>
+    <p:tnLst>
+      <p:par>
+        <p:cTn id="1" dur="indefinite" restart="never" nodeType="tmRoot"/>
+      </p:par>
+    </p:tnLst>
+  </p:timing>
+</p:sld>
+</file>
+
+<file path=ppt/slides/slide9.xml><?xml version="1.0" encoding="utf-8"?>
+<p:sld xmlns:a="http://schemas.openxmlformats.org/drawingml/2006/main" xmlns:r="http://schemas.openxmlformats.org/officeDocument/2006/relationships" xmlns:p="http://schemas.openxmlformats.org/presentationml/2006/main">
+  <p:cSld>
+    <p:spTree>
+      <p:nvGrpSpPr>
+        <p:cNvPr id="1" name=""/>
+        <p:cNvGrpSpPr/>
+        <p:nvPr/>
+      </p:nvGrpSpPr>
+      <p:grpSpPr>
+        <a:xfrm>
+          <a:off x="0" y="0"/>
+          <a:ext cx="0" cy="0"/>
+          <a:chOff x="0" y="0"/>
+          <a:chExt cx="0" cy="0"/>
+        </a:xfrm>
+      </p:grpSpPr>
+      <p:sp>
+        <p:nvSpPr>
+          <p:cNvPr id="2" name="Title 1"/>
+          <p:cNvSpPr>
+            <a:spLocks noGrp="1"/>
+          </p:cNvSpPr>
+          <p:nvPr>
+            <p:ph type="title"/>
+          </p:nvPr>
+        </p:nvSpPr>
+        <p:spPr/>
+        <p:txBody>
+          <a:bodyPr/>
+          <a:lstStyle/>
+          <a:p>
+            <a:r>
+              <a:rPr lang="en-US" dirty="0" smtClean="0"/>
+              <a:t>Building indexes from band intensity is another way to reduce dimensionality</a:t>
+            </a:r>
+            <a:endParaRPr lang="en-US" dirty="0"/>
+          </a:p>
+        </p:txBody>
+      </p:sp>
+      <p:pic>
+        <p:nvPicPr>
+          <p:cNvPr id="5" name="Content Placeholder 4"/>
+          <p:cNvPicPr>
+            <a:picLocks noGrp="1" noChangeAspect="1"/>
+          </p:cNvPicPr>
+          <p:nvPr>
+            <p:ph idx="1"/>
+          </p:nvPr>
+        </p:nvPicPr>
+        <p:blipFill rotWithShape="1">
+          <a:blip r:embed="rId2">
+            <a:extLst>
+              <a:ext uri="{28A0092B-C50C-407E-A947-70E740481C1C}">
+                <a14:useLocalDpi xmlns:a14="http://schemas.microsoft.com/office/drawing/2010/main" val="0"/>
+              </a:ext>
+            </a:extLst>
+          </a:blip>
+          <a:srcRect b="43996"/>
+          <a:stretch/>
+        </p:blipFill>
+        <p:spPr>
+          <a:xfrm>
+            <a:off x="0" y="0"/>
+            <a:ext cx="12192000" cy="3209544"/>
+          </a:xfrm>
+        </p:spPr>
+      </p:pic>
+      <p:pic>
+        <p:nvPicPr>
+          <p:cNvPr id="6" name="Picture 5"/>
+          <p:cNvPicPr>
+            <a:picLocks noChangeAspect="1"/>
+          </p:cNvPicPr>
+          <p:nvPr/>
+        </p:nvPicPr>
+        <p:blipFill rotWithShape="1">
+          <a:blip r:embed="rId3">
+            <a:extLst>
+              <a:ext uri="{28A0092B-C50C-407E-A947-70E740481C1C}">
+                <a14:useLocalDpi xmlns:a14="http://schemas.microsoft.com/office/drawing/2010/main" val="0"/>
+              </a:ext>
+            </a:extLst>
+          </a:blip>
+          <a:srcRect b="35858"/>
+          <a:stretch/>
+        </p:blipFill>
+        <p:spPr>
+          <a:xfrm>
+            <a:off x="0" y="3209544"/>
+            <a:ext cx="12192000" cy="3675888"/>
+          </a:xfrm>
+          <a:prstGeom prst="rect">
+            <a:avLst/>
+          </a:prstGeom>
+        </p:spPr>
+      </p:pic>
+      <p:pic>
+        <p:nvPicPr>
+          <p:cNvPr id="8" name="Picture 7"/>
+          <p:cNvPicPr>
+            <a:picLocks noChangeAspect="1"/>
+          </p:cNvPicPr>
+          <p:nvPr/>
+        </p:nvPicPr>
+        <p:blipFill>
+          <a:blip r:embed="rId4"/>
+          <a:stretch>
+            <a:fillRect/>
+          </a:stretch>
+        </p:blipFill>
+        <p:spPr>
+          <a:xfrm>
+            <a:off x="10320978" y="6224207"/>
+            <a:ext cx="1871022" cy="661225"/>
+          </a:xfrm>
+          <a:prstGeom prst="rect">
+            <a:avLst/>
+          </a:prstGeom>
+        </p:spPr>
+      </p:pic>
+    </p:spTree>
+    <p:extLst>
+      <p:ext uri="{BB962C8B-B14F-4D97-AF65-F5344CB8AC3E}">
+        <p14:creationId xmlns:p14="http://schemas.microsoft.com/office/powerpoint/2010/main" val="645549127"/>
+      </p:ext>
+    </p:extLst>
+  </p:cSld>
+  <p:clrMapOvr>
+    <a:masterClrMapping/>
+  </p:clrMapOvr>
+  <p:timing>
+    <p:tnLst>
+      <p:par>
+        <p:cTn id="1" dur="indefinite" restart="never" nodeType="tmRoot"/>
+      </p:par>
+    </p:tnLst>
+  </p:timing>
 </p:sld>
 </file>
 

</xml_diff>